<commit_message>
Working on stages for Dec
</commit_message>
<xml_diff>
--- a/Match Template.pptx
+++ b/Match Template.pptx
@@ -259,7 +259,7 @@
               <a:pPr>
                 <a:defRPr/>
               </a:pPr>
-              <a:t>6/22/2022</a:t>
+              <a:t>12/6/2022</a:t>
             </a:fld>
             <a:endParaRPr lang="en-US"/>
           </a:p>
@@ -4506,7 +4506,7 @@
           <p:nvPr>
             <p:extLst>
               <p:ext uri="{D42A27DB-BD31-4B8C-83A1-F6EECF244321}">
-                <p14:modId xmlns:p14="http://schemas.microsoft.com/office/powerpoint/2010/main" val="212194899"/>
+                <p14:modId xmlns:p14="http://schemas.microsoft.com/office/powerpoint/2010/main" val="2113577514"/>
               </p:ext>
             </p:extLst>
           </p:nvPr>
@@ -5079,14 +5079,11 @@
                     <a:bodyPr/>
                     <a:lstStyle/>
                     <a:p>
-                      <a:r>
-                        <a:rPr lang="en-US" dirty="0">
-                          <a:solidFill>
-                            <a:schemeClr val="tx1"/>
-                          </a:solidFill>
-                        </a:rPr>
-                        <a:t>USPSA</a:t>
-                      </a:r>
+                      <a:endParaRPr lang="en-US" dirty="0">
+                        <a:solidFill>
+                          <a:schemeClr val="tx1"/>
+                        </a:solidFill>
+                      </a:endParaRPr>
                     </a:p>
                   </a:txBody>
                   <a:tcPr>

</xml_diff>